<commit_message>
Finalized milestone 1 submission, continued work on TSTracker, started work on audio processor (webworklet). Note that webworklets need to be run on a secure context (which panopto and luminus enforces so it's ok). Also AnalyzerNodes are useless because they can only process data during runtime.
</commit_message>
<xml_diff>
--- a/Skylab documents/Ignition Slides/Presentation1.pptx
+++ b/Skylab documents/Ignition Slides/Presentation1.pptx
@@ -261,7 +261,7 @@
           <a:p>
             <a:fld id="{68DB185E-D2F1-4159-8F71-195F38FC89AA}" type="datetimeFigureOut">
               <a:rPr lang="en-SG" smtClean="0"/>
-              <a:t>14/5/2019</a:t>
+              <a:t>24/5/2019</a:t>
             </a:fld>
             <a:endParaRPr lang="en-SG"/>
           </a:p>
@@ -461,7 +461,7 @@
           <a:p>
             <a:fld id="{68DB185E-D2F1-4159-8F71-195F38FC89AA}" type="datetimeFigureOut">
               <a:rPr lang="en-SG" smtClean="0"/>
-              <a:t>14/5/2019</a:t>
+              <a:t>24/5/2019</a:t>
             </a:fld>
             <a:endParaRPr lang="en-SG"/>
           </a:p>
@@ -671,7 +671,7 @@
           <a:p>
             <a:fld id="{68DB185E-D2F1-4159-8F71-195F38FC89AA}" type="datetimeFigureOut">
               <a:rPr lang="en-SG" smtClean="0"/>
-              <a:t>14/5/2019</a:t>
+              <a:t>24/5/2019</a:t>
             </a:fld>
             <a:endParaRPr lang="en-SG"/>
           </a:p>
@@ -871,7 +871,7 @@
           <a:p>
             <a:fld id="{68DB185E-D2F1-4159-8F71-195F38FC89AA}" type="datetimeFigureOut">
               <a:rPr lang="en-SG" smtClean="0"/>
-              <a:t>14/5/2019</a:t>
+              <a:t>24/5/2019</a:t>
             </a:fld>
             <a:endParaRPr lang="en-SG"/>
           </a:p>
@@ -1147,7 +1147,7 @@
           <a:p>
             <a:fld id="{68DB185E-D2F1-4159-8F71-195F38FC89AA}" type="datetimeFigureOut">
               <a:rPr lang="en-SG" smtClean="0"/>
-              <a:t>14/5/2019</a:t>
+              <a:t>24/5/2019</a:t>
             </a:fld>
             <a:endParaRPr lang="en-SG"/>
           </a:p>
@@ -1415,7 +1415,7 @@
           <a:p>
             <a:fld id="{68DB185E-D2F1-4159-8F71-195F38FC89AA}" type="datetimeFigureOut">
               <a:rPr lang="en-SG" smtClean="0"/>
-              <a:t>14/5/2019</a:t>
+              <a:t>24/5/2019</a:t>
             </a:fld>
             <a:endParaRPr lang="en-SG"/>
           </a:p>
@@ -1830,7 +1830,7 @@
           <a:p>
             <a:fld id="{68DB185E-D2F1-4159-8F71-195F38FC89AA}" type="datetimeFigureOut">
               <a:rPr lang="en-SG" smtClean="0"/>
-              <a:t>14/5/2019</a:t>
+              <a:t>24/5/2019</a:t>
             </a:fld>
             <a:endParaRPr lang="en-SG"/>
           </a:p>
@@ -1972,7 +1972,7 @@
           <a:p>
             <a:fld id="{68DB185E-D2F1-4159-8F71-195F38FC89AA}" type="datetimeFigureOut">
               <a:rPr lang="en-SG" smtClean="0"/>
-              <a:t>14/5/2019</a:t>
+              <a:t>24/5/2019</a:t>
             </a:fld>
             <a:endParaRPr lang="en-SG"/>
           </a:p>
@@ -2085,7 +2085,7 @@
           <a:p>
             <a:fld id="{68DB185E-D2F1-4159-8F71-195F38FC89AA}" type="datetimeFigureOut">
               <a:rPr lang="en-SG" smtClean="0"/>
-              <a:t>14/5/2019</a:t>
+              <a:t>24/5/2019</a:t>
             </a:fld>
             <a:endParaRPr lang="en-SG"/>
           </a:p>
@@ -2398,7 +2398,7 @@
           <a:p>
             <a:fld id="{68DB185E-D2F1-4159-8F71-195F38FC89AA}" type="datetimeFigureOut">
               <a:rPr lang="en-SG" smtClean="0"/>
-              <a:t>14/5/2019</a:t>
+              <a:t>24/5/2019</a:t>
             </a:fld>
             <a:endParaRPr lang="en-SG"/>
           </a:p>
@@ -2687,7 +2687,7 @@
           <a:p>
             <a:fld id="{68DB185E-D2F1-4159-8F71-195F38FC89AA}" type="datetimeFigureOut">
               <a:rPr lang="en-SG" smtClean="0"/>
-              <a:t>14/5/2019</a:t>
+              <a:t>24/5/2019</a:t>
             </a:fld>
             <a:endParaRPr lang="en-SG"/>
           </a:p>
@@ -2930,7 +2930,7 @@
           <a:p>
             <a:fld id="{68DB185E-D2F1-4159-8F71-195F38FC89AA}" type="datetimeFigureOut">
               <a:rPr lang="en-SG" smtClean="0"/>
-              <a:t>14/5/2019</a:t>
+              <a:t>24/5/2019</a:t>
             </a:fld>
             <a:endParaRPr lang="en-SG"/>
           </a:p>
@@ -3400,7 +3400,12 @@
             <p:ph idx="1"/>
           </p:nvPr>
         </p:nvSpPr>
-        <p:spPr/>
+        <p:spPr>
+          <a:xfrm>
+            <a:off x="838200" y="1825625"/>
+            <a:ext cx="5685148" cy="4351338"/>
+          </a:xfrm>
+        </p:spPr>
         <p:txBody>
           <a:bodyPr>
             <a:normAutofit/>
@@ -3429,48 +3434,48 @@
             </a:pPr>
             <a:r>
               <a:rPr lang="en-US" dirty="0"/>
-              <a:t>Features:</a:t>
+              <a:t>Key Features:</a:t>
             </a:r>
           </a:p>
           <a:p>
             <a:pPr lvl="1"/>
             <a:r>
               <a:rPr lang="en-US" dirty="0"/>
-              <a:t>Improved user-friendliness</a:t>
+              <a:t>Improved user interface</a:t>
             </a:r>
           </a:p>
           <a:p>
             <a:pPr lvl="2"/>
             <a:r>
               <a:rPr lang="en-US" dirty="0"/>
-              <a:t>e.g. wider range of video playback speeds, restructuring of page to allow for more space for the video webcast</a:t>
+              <a:t>Faster playback speed options</a:t>
+            </a:r>
+          </a:p>
+          <a:p>
+            <a:pPr lvl="2"/>
+            <a:r>
+              <a:rPr lang="en-US" dirty="0"/>
+              <a:t>Persistent user settings</a:t>
             </a:r>
           </a:p>
           <a:p>
             <a:pPr lvl="1"/>
             <a:r>
               <a:rPr lang="en-US" dirty="0"/>
-              <a:t>Machine Text Transcription (Machine-generated subtitles for webcasts)</a:t>
-            </a:r>
-          </a:p>
-          <a:p>
-            <a:pPr lvl="2"/>
+              <a:t>Subtitles </a:t>
+            </a:r>
+            <a:r>
+              <a:rPr lang="en-US"/>
+              <a:t>&amp; Transcript</a:t>
+            </a:r>
+            <a:endParaRPr lang="en-US" dirty="0"/>
+          </a:p>
+          <a:p>
+            <a:pPr lvl="1"/>
             <a:r>
               <a:rPr lang="en-US" dirty="0"/>
-              <a:t>Users can click sections of the transcript to seek to that video timeframe</a:t>
-            </a:r>
-          </a:p>
-          <a:p>
-            <a:pPr lvl="1"/>
-            <a:r>
-              <a:rPr lang="en-US" dirty="0"/>
-              <a:t>Auto fast-forwarding of silent sections in </a:t>
-            </a:r>
-            <a:r>
-              <a:rPr lang="en-US"/>
-              <a:t>the webcast</a:t>
-            </a:r>
-            <a:endParaRPr lang="en-US" dirty="0"/>
+              <a:t>Auto removal of silent sections in the webcast</a:t>
+            </a:r>
           </a:p>
         </p:txBody>
       </p:sp>

</xml_diff>